<commit_message>
Updating lecture slides that were corrupted in an earlier commit.
</commit_message>
<xml_diff>
--- a/Lectures/CS235 - UI Design - Lecture #03 - 2015.01.29.pptx
+++ b/Lectures/CS235 - UI Design - Lecture #03 - 2015.01.29.pptx
@@ -233,8 +233,7 @@
           <a:p>
             <a:fld id="{D4172681-C581-F644-AAF5-C092E01AA013}" type="datetimeFigureOut">
               <a:rPr lang="en-US" smtClean="0"/>
-              <a:pPr/>
-              <a:t>1/31/2015</a:t>
+              <a:t>1/29/15</a:t>
             </a:fld>
             <a:endParaRPr lang="en-US"/>
           </a:p>
@@ -300,7 +299,6 @@
           <a:p>
             <a:fld id="{C2A581D9-7090-374C-A542-C325CF1D3FFC}" type="slidenum">
               <a:rPr lang="en-US" smtClean="0"/>
-              <a:pPr/>
               <a:t>‹#›</a:t>
             </a:fld>
             <a:endParaRPr lang="en-US"/>
@@ -310,7 +308,7 @@
     </p:spTree>
     <p:extLst>
       <p:ext uri="{BB962C8B-B14F-4D97-AF65-F5344CB8AC3E}">
-        <p14:creationId xmlns:p14="http://schemas.microsoft.com/office/powerpoint/2010/main" xmlns="" val="2257200665"/>
+        <p14:creationId xmlns:p14="http://schemas.microsoft.com/office/powerpoint/2010/main" val="2257200665"/>
       </p:ext>
     </p:extLst>
   </p:cSld>
@@ -369,14 +367,14 @@
           <a:effectLst/>
           <a:extLst>
             <a:ext uri="{909E8E84-426E-40dd-AFC4-6F175D3DCCD1}">
-              <a14:hiddenFill xmlns:a14="http://schemas.microsoft.com/office/drawing/2010/main" xmlns="">
+              <a14:hiddenFill xmlns:a14="http://schemas.microsoft.com/office/drawing/2010/main">
                 <a:solidFill>
                   <a:schemeClr val="accent1"/>
                 </a:solidFill>
               </a14:hiddenFill>
             </a:ext>
             <a:ext uri="{91240B29-F687-4f45-9708-019B960494DF}">
-              <a14:hiddenLine xmlns:a14="http://schemas.microsoft.com/office/drawing/2010/main" xmlns="" w="9525">
+              <a14:hiddenLine xmlns:a14="http://schemas.microsoft.com/office/drawing/2010/main" w="9525">
                 <a:solidFill>
                   <a:schemeClr val="tx1"/>
                 </a:solidFill>
@@ -386,7 +384,7 @@
               </a14:hiddenLine>
             </a:ext>
             <a:ext uri="{AF507438-7753-43e0-B8FC-AC1667EBCBE1}">
-              <a14:hiddenEffects xmlns:a14="http://schemas.microsoft.com/office/drawing/2010/main" xmlns="">
+              <a14:hiddenEffects xmlns:a14="http://schemas.microsoft.com/office/drawing/2010/main">
                 <a:effectLst>
                   <a:outerShdw blurRad="63500" dist="38099" dir="2700000" algn="ctr" rotWithShape="0">
                     <a:schemeClr val="bg2">
@@ -397,7 +395,7 @@
               </a14:hiddenEffects>
             </a:ext>
             <a:ext uri="{FAA26D3D-D897-4be2-8F04-BA451C77F1D7}">
-              <ma14:placeholderFlag xmlns:ma14="http://schemas.microsoft.com/office/mac/drawingml/2011/main" xmlns="" val="1"/>
+              <ma14:placeholderFlag xmlns:ma14="http://schemas.microsoft.com/office/mac/drawingml/2011/main" val="1"/>
             </a:ext>
           </a:extLst>
         </p:spPr>
@@ -442,14 +440,14 @@
           <a:effectLst/>
           <a:extLst>
             <a:ext uri="{909E8E84-426E-40dd-AFC4-6F175D3DCCD1}">
-              <a14:hiddenFill xmlns:a14="http://schemas.microsoft.com/office/drawing/2010/main" xmlns="">
+              <a14:hiddenFill xmlns:a14="http://schemas.microsoft.com/office/drawing/2010/main">
                 <a:solidFill>
                   <a:schemeClr val="accent1"/>
                 </a:solidFill>
               </a14:hiddenFill>
             </a:ext>
             <a:ext uri="{91240B29-F687-4f45-9708-019B960494DF}">
-              <a14:hiddenLine xmlns:a14="http://schemas.microsoft.com/office/drawing/2010/main" xmlns="" w="9525">
+              <a14:hiddenLine xmlns:a14="http://schemas.microsoft.com/office/drawing/2010/main" w="9525">
                 <a:solidFill>
                   <a:schemeClr val="tx1"/>
                 </a:solidFill>
@@ -459,7 +457,7 @@
               </a14:hiddenLine>
             </a:ext>
             <a:ext uri="{AF507438-7753-43e0-B8FC-AC1667EBCBE1}">
-              <a14:hiddenEffects xmlns:a14="http://schemas.microsoft.com/office/drawing/2010/main" xmlns="">
+              <a14:hiddenEffects xmlns:a14="http://schemas.microsoft.com/office/drawing/2010/main">
                 <a:effectLst>
                   <a:outerShdw blurRad="63500" dist="38099" dir="2700000" algn="ctr" rotWithShape="0">
                     <a:schemeClr val="bg2">
@@ -470,7 +468,7 @@
               </a14:hiddenEffects>
             </a:ext>
             <a:ext uri="{FAA26D3D-D897-4be2-8F04-BA451C77F1D7}">
-              <ma14:placeholderFlag xmlns:ma14="http://schemas.microsoft.com/office/mac/drawingml/2011/main" xmlns="" val="1"/>
+              <ma14:placeholderFlag xmlns:ma14="http://schemas.microsoft.com/office/mac/drawingml/2011/main" val="1"/>
             </a:ext>
           </a:extLst>
         </p:spPr>
@@ -520,7 +518,7 @@
           <a:effectLst/>
           <a:extLst>
             <a:ext uri="{AF507438-7753-43e0-B8FC-AC1667EBCBE1}">
-              <a14:hiddenEffects xmlns:a14="http://schemas.microsoft.com/office/drawing/2010/main" xmlns="">
+              <a14:hiddenEffects xmlns:a14="http://schemas.microsoft.com/office/drawing/2010/main">
                 <a:effectLst>
                   <a:outerShdw blurRad="63500" dist="38099" dir="2700000" algn="ctr" rotWithShape="0">
                     <a:srgbClr val="000000">
@@ -531,7 +529,7 @@
               </a14:hiddenEffects>
             </a:ext>
             <a:ext uri="{53640926-AAD7-44d8-BBD7-CCE9431645EC}">
-              <a14:shadowObscured xmlns:a14="http://schemas.microsoft.com/office/drawing/2010/main" xmlns="" val="1"/>
+              <a14:shadowObscured xmlns:a14="http://schemas.microsoft.com/office/drawing/2010/main" val="1"/>
             </a:ext>
           </a:extLst>
         </p:spPr>
@@ -561,14 +559,14 @@
           <a:effectLst/>
           <a:extLst>
             <a:ext uri="{909E8E84-426E-40dd-AFC4-6F175D3DCCD1}">
-              <a14:hiddenFill xmlns:a14="http://schemas.microsoft.com/office/drawing/2010/main" xmlns="">
+              <a14:hiddenFill xmlns:a14="http://schemas.microsoft.com/office/drawing/2010/main">
                 <a:solidFill>
                   <a:schemeClr val="accent1"/>
                 </a:solidFill>
               </a14:hiddenFill>
             </a:ext>
             <a:ext uri="{91240B29-F687-4f45-9708-019B960494DF}">
-              <a14:hiddenLine xmlns:a14="http://schemas.microsoft.com/office/drawing/2010/main" xmlns="" w="9525">
+              <a14:hiddenLine xmlns:a14="http://schemas.microsoft.com/office/drawing/2010/main" w="9525">
                 <a:solidFill>
                   <a:schemeClr val="tx1"/>
                 </a:solidFill>
@@ -578,7 +576,7 @@
               </a14:hiddenLine>
             </a:ext>
             <a:ext uri="{AF507438-7753-43e0-B8FC-AC1667EBCBE1}">
-              <a14:hiddenEffects xmlns:a14="http://schemas.microsoft.com/office/drawing/2010/main" xmlns="">
+              <a14:hiddenEffects xmlns:a14="http://schemas.microsoft.com/office/drawing/2010/main">
                 <a:effectLst>
                   <a:outerShdw blurRad="63500" dist="38099" dir="2700000" algn="ctr" rotWithShape="0">
                     <a:schemeClr val="bg2">
@@ -589,7 +587,7 @@
               </a14:hiddenEffects>
             </a:ext>
             <a:ext uri="{FAA26D3D-D897-4be2-8F04-BA451C77F1D7}">
-              <ma14:placeholderFlag xmlns:ma14="http://schemas.microsoft.com/office/mac/drawingml/2011/main" xmlns="" val="1"/>
+              <ma14:placeholderFlag xmlns:ma14="http://schemas.microsoft.com/office/mac/drawingml/2011/main" val="1"/>
             </a:ext>
           </a:extLst>
         </p:spPr>
@@ -662,14 +660,14 @@
           <a:effectLst/>
           <a:extLst>
             <a:ext uri="{909E8E84-426E-40dd-AFC4-6F175D3DCCD1}">
-              <a14:hiddenFill xmlns:a14="http://schemas.microsoft.com/office/drawing/2010/main" xmlns="">
+              <a14:hiddenFill xmlns:a14="http://schemas.microsoft.com/office/drawing/2010/main">
                 <a:solidFill>
                   <a:schemeClr val="accent1"/>
                 </a:solidFill>
               </a14:hiddenFill>
             </a:ext>
             <a:ext uri="{91240B29-F687-4f45-9708-019B960494DF}">
-              <a14:hiddenLine xmlns:a14="http://schemas.microsoft.com/office/drawing/2010/main" xmlns="" w="9525">
+              <a14:hiddenLine xmlns:a14="http://schemas.microsoft.com/office/drawing/2010/main" w="9525">
                 <a:solidFill>
                   <a:schemeClr val="tx1"/>
                 </a:solidFill>
@@ -679,7 +677,7 @@
               </a14:hiddenLine>
             </a:ext>
             <a:ext uri="{AF507438-7753-43e0-B8FC-AC1667EBCBE1}">
-              <a14:hiddenEffects xmlns:a14="http://schemas.microsoft.com/office/drawing/2010/main" xmlns="">
+              <a14:hiddenEffects xmlns:a14="http://schemas.microsoft.com/office/drawing/2010/main">
                 <a:effectLst>
                   <a:outerShdw blurRad="63500" dist="38099" dir="2700000" algn="ctr" rotWithShape="0">
                     <a:schemeClr val="bg2">
@@ -690,7 +688,7 @@
               </a14:hiddenEffects>
             </a:ext>
             <a:ext uri="{FAA26D3D-D897-4be2-8F04-BA451C77F1D7}">
-              <ma14:placeholderFlag xmlns:ma14="http://schemas.microsoft.com/office/mac/drawingml/2011/main" xmlns="" val="1"/>
+              <ma14:placeholderFlag xmlns:ma14="http://schemas.microsoft.com/office/mac/drawingml/2011/main" val="1"/>
             </a:ext>
           </a:extLst>
         </p:spPr>
@@ -735,14 +733,14 @@
           <a:effectLst/>
           <a:extLst>
             <a:ext uri="{909E8E84-426E-40dd-AFC4-6F175D3DCCD1}">
-              <a14:hiddenFill xmlns:a14="http://schemas.microsoft.com/office/drawing/2010/main" xmlns="">
+              <a14:hiddenFill xmlns:a14="http://schemas.microsoft.com/office/drawing/2010/main">
                 <a:solidFill>
                   <a:schemeClr val="accent1"/>
                 </a:solidFill>
               </a14:hiddenFill>
             </a:ext>
             <a:ext uri="{91240B29-F687-4f45-9708-019B960494DF}">
-              <a14:hiddenLine xmlns:a14="http://schemas.microsoft.com/office/drawing/2010/main" xmlns="" w="9525">
+              <a14:hiddenLine xmlns:a14="http://schemas.microsoft.com/office/drawing/2010/main" w="9525">
                 <a:solidFill>
                   <a:schemeClr val="tx1"/>
                 </a:solidFill>
@@ -752,7 +750,7 @@
               </a14:hiddenLine>
             </a:ext>
             <a:ext uri="{AF507438-7753-43e0-B8FC-AC1667EBCBE1}">
-              <a14:hiddenEffects xmlns:a14="http://schemas.microsoft.com/office/drawing/2010/main" xmlns="">
+              <a14:hiddenEffects xmlns:a14="http://schemas.microsoft.com/office/drawing/2010/main">
                 <a:effectLst>
                   <a:outerShdw blurRad="63500" dist="38099" dir="2700000" algn="ctr" rotWithShape="0">
                     <a:schemeClr val="bg2">
@@ -763,7 +761,7 @@
               </a14:hiddenEffects>
             </a:ext>
             <a:ext uri="{FAA26D3D-D897-4be2-8F04-BA451C77F1D7}">
-              <ma14:placeholderFlag xmlns:ma14="http://schemas.microsoft.com/office/mac/drawingml/2011/main" xmlns="" val="1"/>
+              <ma14:placeholderFlag xmlns:ma14="http://schemas.microsoft.com/office/mac/drawingml/2011/main" val="1"/>
             </a:ext>
           </a:extLst>
         </p:spPr>
@@ -791,7 +789,7 @@
     </p:spTree>
     <p:extLst>
       <p:ext uri="{BB962C8B-B14F-4D97-AF65-F5344CB8AC3E}">
-        <p14:creationId xmlns:p14="http://schemas.microsoft.com/office/powerpoint/2010/main" xmlns="" val="2181768727"/>
+        <p14:creationId xmlns:p14="http://schemas.microsoft.com/office/powerpoint/2010/main" val="2181768727"/>
       </p:ext>
     </p:extLst>
   </p:cSld>
@@ -964,7 +962,7 @@
           <a:effectLst/>
           <a:extLst>
             <a:ext uri="{91240B29-F687-4f45-9708-019B960494DF}">
-              <a14:hiddenLine xmlns:a14="http://schemas.microsoft.com/office/drawing/2010/main" xmlns="" w="12700">
+              <a14:hiddenLine xmlns:a14="http://schemas.microsoft.com/office/drawing/2010/main" w="12700">
                 <a:solidFill>
                   <a:schemeClr val="tx1"/>
                 </a:solidFill>
@@ -974,7 +972,7 @@
               </a14:hiddenLine>
             </a:ext>
             <a:ext uri="{AF507438-7753-43e0-B8FC-AC1667EBCBE1}">
-              <a14:hiddenEffects xmlns:a14="http://schemas.microsoft.com/office/drawing/2010/main" xmlns="">
+              <a14:hiddenEffects xmlns:a14="http://schemas.microsoft.com/office/drawing/2010/main">
                 <a:effectLst>
                   <a:outerShdw blurRad="63500" dist="38099" dir="2700000" algn="ctr" rotWithShape="0">
                     <a:schemeClr val="bg2">
@@ -1109,7 +1107,7 @@
             <a:effectLst/>
             <a:extLst>
               <a:ext uri="{AF507438-7753-43e0-B8FC-AC1667EBCBE1}">
-                <a14:hiddenEffects xmlns:a14="http://schemas.microsoft.com/office/drawing/2010/main" xmlns="">
+                <a14:hiddenEffects xmlns:a14="http://schemas.microsoft.com/office/drawing/2010/main">
                   <a:effectLst>
                     <a:outerShdw blurRad="63500" dist="38099" dir="2700000" algn="ctr" rotWithShape="0">
                       <a:schemeClr val="bg2">
@@ -1162,7 +1160,7 @@
             <a:effectLst/>
             <a:extLst>
               <a:ext uri="{AF507438-7753-43e0-B8FC-AC1667EBCBE1}">
-                <a14:hiddenEffects xmlns:a14="http://schemas.microsoft.com/office/drawing/2010/main" xmlns="">
+                <a14:hiddenEffects xmlns:a14="http://schemas.microsoft.com/office/drawing/2010/main">
                   <a:effectLst>
                     <a:outerShdw blurRad="63500" dist="38099" dir="2700000" algn="ctr" rotWithShape="0">
                       <a:schemeClr val="bg2">
@@ -1215,7 +1213,7 @@
             <a:effectLst/>
             <a:extLst>
               <a:ext uri="{AF507438-7753-43e0-B8FC-AC1667EBCBE1}">
-                <a14:hiddenEffects xmlns:a14="http://schemas.microsoft.com/office/drawing/2010/main" xmlns="">
+                <a14:hiddenEffects xmlns:a14="http://schemas.microsoft.com/office/drawing/2010/main">
                   <a:effectLst>
                     <a:outerShdw blurRad="63500" dist="38099" dir="2700000" algn="ctr" rotWithShape="0">
                       <a:schemeClr val="bg2">
@@ -1268,7 +1266,7 @@
             <a:effectLst/>
             <a:extLst>
               <a:ext uri="{AF507438-7753-43e0-B8FC-AC1667EBCBE1}">
-                <a14:hiddenEffects xmlns:a14="http://schemas.microsoft.com/office/drawing/2010/main" xmlns="">
+                <a14:hiddenEffects xmlns:a14="http://schemas.microsoft.com/office/drawing/2010/main">
                   <a:effectLst>
                     <a:outerShdw blurRad="63500" dist="38099" dir="2700000" algn="ctr" rotWithShape="0">
                       <a:schemeClr val="bg2">
@@ -1319,12 +1317,12 @@
             <a:effectLst/>
             <a:extLst>
               <a:ext uri="{909E8E84-426E-40dd-AFC4-6F175D3DCCD1}">
-                <a14:hiddenFill xmlns:a14="http://schemas.microsoft.com/office/drawing/2010/main" xmlns="">
+                <a14:hiddenFill xmlns:a14="http://schemas.microsoft.com/office/drawing/2010/main">
                   <a:noFill/>
                 </a14:hiddenFill>
               </a:ext>
               <a:ext uri="{AF507438-7753-43e0-B8FC-AC1667EBCBE1}">
-                <a14:hiddenEffects xmlns:a14="http://schemas.microsoft.com/office/drawing/2010/main" xmlns="">
+                <a14:hiddenEffects xmlns:a14="http://schemas.microsoft.com/office/drawing/2010/main">
                   <a:effectLst>
                     <a:outerShdw blurRad="63500" dist="38099" dir="2700000" algn="ctr" rotWithShape="0">
                       <a:schemeClr val="bg2">
@@ -1372,14 +1370,14 @@
             <a:effectLst/>
             <a:extLst>
               <a:ext uri="{909E8E84-426E-40dd-AFC4-6F175D3DCCD1}">
-                <a14:hiddenFill xmlns:a14="http://schemas.microsoft.com/office/drawing/2010/main" xmlns="">
+                <a14:hiddenFill xmlns:a14="http://schemas.microsoft.com/office/drawing/2010/main">
                   <a:solidFill>
                     <a:schemeClr val="accent1"/>
                   </a:solidFill>
                 </a14:hiddenFill>
               </a:ext>
               <a:ext uri="{AF507438-7753-43e0-B8FC-AC1667EBCBE1}">
-                <a14:hiddenEffects xmlns:a14="http://schemas.microsoft.com/office/drawing/2010/main" xmlns="">
+                <a14:hiddenEffects xmlns:a14="http://schemas.microsoft.com/office/drawing/2010/main">
                   <a:effectLst>
                     <a:outerShdw blurRad="63500" dist="38099" dir="2700000" algn="ctr" rotWithShape="0">
                       <a:schemeClr val="bg2">
@@ -1411,7 +1409,7 @@
   <p:timing>
     <p:tnLst>
       <p:par>
-        <p:cTn id="1" dur="indefinite" restart="never" nodeType="tmRoot"/>
+        <p:cTn xmlns:p14="http://schemas.microsoft.com/office/powerpoint/2010/main" id="1" dur="indefinite" restart="never" nodeType="tmRoot"/>
       </p:par>
     </p:tnLst>
   </p:timing>
@@ -1541,7 +1539,7 @@
     </p:spTree>
     <p:extLst>
       <p:ext uri="{BB962C8B-B14F-4D97-AF65-F5344CB8AC3E}">
-        <p14:creationId xmlns:p14="http://schemas.microsoft.com/office/powerpoint/2010/main" xmlns="" val="2277753422"/>
+        <p14:creationId xmlns:p14="http://schemas.microsoft.com/office/powerpoint/2010/main" val="2277753422"/>
       </p:ext>
     </p:extLst>
   </p:cSld>
@@ -1601,14 +1599,14 @@
           <a:effectLst/>
           <a:extLst>
             <a:ext uri="{909E8E84-426E-40dd-AFC4-6F175D3DCCD1}">
-              <a14:hiddenFill xmlns:a14="http://schemas.microsoft.com/office/drawing/2010/main" xmlns="">
+              <a14:hiddenFill xmlns:a14="http://schemas.microsoft.com/office/drawing/2010/main">
                 <a:solidFill>
                   <a:schemeClr val="accent1"/>
                 </a:solidFill>
               </a14:hiddenFill>
             </a:ext>
             <a:ext uri="{91240B29-F687-4f45-9708-019B960494DF}">
-              <a14:hiddenLine xmlns:a14="http://schemas.microsoft.com/office/drawing/2010/main" xmlns="" w="9525">
+              <a14:hiddenLine xmlns:a14="http://schemas.microsoft.com/office/drawing/2010/main" w="9525">
                 <a:solidFill>
                   <a:schemeClr val="tx1"/>
                 </a:solidFill>
@@ -1618,7 +1616,7 @@
               </a14:hiddenLine>
             </a:ext>
             <a:ext uri="{AF507438-7753-43e0-B8FC-AC1667EBCBE1}">
-              <a14:hiddenEffects xmlns:a14="http://schemas.microsoft.com/office/drawing/2010/main" xmlns="">
+              <a14:hiddenEffects xmlns:a14="http://schemas.microsoft.com/office/drawing/2010/main">
                 <a:effectLst>
                   <a:outerShdw blurRad="63500" dist="38099" dir="2700000" algn="ctr" rotWithShape="0">
                     <a:schemeClr val="bg2">
@@ -1629,7 +1627,7 @@
               </a14:hiddenEffects>
             </a:ext>
             <a:ext uri="{FAA26D3D-D897-4be2-8F04-BA451C77F1D7}">
-              <ma14:placeholderFlag xmlns:ma14="http://schemas.microsoft.com/office/mac/drawingml/2011/main" xmlns="" val="1"/>
+              <ma14:placeholderFlag xmlns:ma14="http://schemas.microsoft.com/office/mac/drawingml/2011/main" val="1"/>
             </a:ext>
           </a:extLst>
         </p:spPr>
@@ -1674,14 +1672,14 @@
           <a:effectLst/>
           <a:extLst>
             <a:ext uri="{909E8E84-426E-40dd-AFC4-6F175D3DCCD1}">
-              <a14:hiddenFill xmlns:a14="http://schemas.microsoft.com/office/drawing/2010/main" xmlns="">
+              <a14:hiddenFill xmlns:a14="http://schemas.microsoft.com/office/drawing/2010/main">
                 <a:solidFill>
                   <a:schemeClr val="accent1"/>
                 </a:solidFill>
               </a14:hiddenFill>
             </a:ext>
             <a:ext uri="{91240B29-F687-4f45-9708-019B960494DF}">
-              <a14:hiddenLine xmlns:a14="http://schemas.microsoft.com/office/drawing/2010/main" xmlns="" w="9525">
+              <a14:hiddenLine xmlns:a14="http://schemas.microsoft.com/office/drawing/2010/main" w="9525">
                 <a:solidFill>
                   <a:schemeClr val="tx1"/>
                 </a:solidFill>
@@ -1691,7 +1689,7 @@
               </a14:hiddenLine>
             </a:ext>
             <a:ext uri="{AF507438-7753-43e0-B8FC-AC1667EBCBE1}">
-              <a14:hiddenEffects xmlns:a14="http://schemas.microsoft.com/office/drawing/2010/main" xmlns="">
+              <a14:hiddenEffects xmlns:a14="http://schemas.microsoft.com/office/drawing/2010/main">
                 <a:effectLst>
                   <a:outerShdw blurRad="63500" dist="38099" dir="2700000" algn="ctr" rotWithShape="0">
                     <a:schemeClr val="bg2">
@@ -1702,7 +1700,7 @@
               </a14:hiddenEffects>
             </a:ext>
             <a:ext uri="{FAA26D3D-D897-4be2-8F04-BA451C77F1D7}">
-              <ma14:placeholderFlag xmlns:ma14="http://schemas.microsoft.com/office/mac/drawingml/2011/main" xmlns="" val="1"/>
+              <ma14:placeholderFlag xmlns:ma14="http://schemas.microsoft.com/office/mac/drawingml/2011/main" val="1"/>
             </a:ext>
           </a:extLst>
         </p:spPr>
@@ -1775,14 +1773,14 @@
           <a:effectLst/>
           <a:extLst>
             <a:ext uri="{909E8E84-426E-40dd-AFC4-6F175D3DCCD1}">
-              <a14:hiddenFill xmlns:a14="http://schemas.microsoft.com/office/drawing/2010/main" xmlns="">
+              <a14:hiddenFill xmlns:a14="http://schemas.microsoft.com/office/drawing/2010/main">
                 <a:solidFill>
                   <a:schemeClr val="accent1"/>
                 </a:solidFill>
               </a14:hiddenFill>
             </a:ext>
             <a:ext uri="{91240B29-F687-4f45-9708-019B960494DF}">
-              <a14:hiddenLine xmlns:a14="http://schemas.microsoft.com/office/drawing/2010/main" xmlns="" w="9525">
+              <a14:hiddenLine xmlns:a14="http://schemas.microsoft.com/office/drawing/2010/main" w="9525">
                 <a:solidFill>
                   <a:schemeClr val="tx1"/>
                 </a:solidFill>
@@ -1792,7 +1790,7 @@
               </a14:hiddenLine>
             </a:ext>
             <a:ext uri="{AF507438-7753-43e0-B8FC-AC1667EBCBE1}">
-              <a14:hiddenEffects xmlns:a14="http://schemas.microsoft.com/office/drawing/2010/main" xmlns="">
+              <a14:hiddenEffects xmlns:a14="http://schemas.microsoft.com/office/drawing/2010/main">
                 <a:effectLst>
                   <a:outerShdw blurRad="63500" dist="38099" dir="2700000" algn="ctr" rotWithShape="0">
                     <a:schemeClr val="bg2">
@@ -1803,7 +1801,7 @@
               </a14:hiddenEffects>
             </a:ext>
             <a:ext uri="{FAA26D3D-D897-4be2-8F04-BA451C77F1D7}">
-              <ma14:placeholderFlag xmlns:ma14="http://schemas.microsoft.com/office/mac/drawingml/2011/main" xmlns="" val="1"/>
+              <ma14:placeholderFlag xmlns:ma14="http://schemas.microsoft.com/office/mac/drawingml/2011/main" val="1"/>
             </a:ext>
           </a:extLst>
         </p:spPr>
@@ -1872,12 +1870,12 @@
             <a:effectLst/>
             <a:extLst>
               <a:ext uri="{909E8E84-426E-40dd-AFC4-6F175D3DCCD1}">
-                <a14:hiddenFill xmlns:a14="http://schemas.microsoft.com/office/drawing/2010/main" xmlns="">
+                <a14:hiddenFill xmlns:a14="http://schemas.microsoft.com/office/drawing/2010/main">
                   <a:noFill/>
                 </a14:hiddenFill>
               </a:ext>
               <a:ext uri="{AF507438-7753-43e0-B8FC-AC1667EBCBE1}">
-                <a14:hiddenEffects xmlns:a14="http://schemas.microsoft.com/office/drawing/2010/main" xmlns="">
+                <a14:hiddenEffects xmlns:a14="http://schemas.microsoft.com/office/drawing/2010/main">
                   <a:effectLst>
                     <a:outerShdw blurRad="63500" dist="38099" dir="2700000" algn="ctr" rotWithShape="0">
                       <a:schemeClr val="bg2">
@@ -1927,7 +1925,7 @@
             <a:effectLst/>
             <a:extLst>
               <a:ext uri="{AF507438-7753-43e0-B8FC-AC1667EBCBE1}">
-                <a14:hiddenEffects xmlns:a14="http://schemas.microsoft.com/office/drawing/2010/main" xmlns="">
+                <a14:hiddenEffects xmlns:a14="http://schemas.microsoft.com/office/drawing/2010/main">
                   <a:effectLst>
                     <a:outerShdw blurRad="63500" dist="38099" dir="2700000" algn="ctr" rotWithShape="0">
                       <a:schemeClr val="bg2">
@@ -1980,7 +1978,7 @@
             <a:effectLst/>
             <a:extLst>
               <a:ext uri="{AF507438-7753-43e0-B8FC-AC1667EBCBE1}">
-                <a14:hiddenEffects xmlns:a14="http://schemas.microsoft.com/office/drawing/2010/main" xmlns="">
+                <a14:hiddenEffects xmlns:a14="http://schemas.microsoft.com/office/drawing/2010/main">
                   <a:effectLst>
                     <a:outerShdw blurRad="63500" dist="38099" dir="2700000" algn="ctr" rotWithShape="0">
                       <a:schemeClr val="bg2">
@@ -2033,7 +2031,7 @@
             <a:effectLst/>
             <a:extLst>
               <a:ext uri="{AF507438-7753-43e0-B8FC-AC1667EBCBE1}">
-                <a14:hiddenEffects xmlns:a14="http://schemas.microsoft.com/office/drawing/2010/main" xmlns="">
+                <a14:hiddenEffects xmlns:a14="http://schemas.microsoft.com/office/drawing/2010/main">
                   <a:effectLst>
                     <a:outerShdw blurRad="63500" dist="38099" dir="2700000" algn="ctr" rotWithShape="0">
                       <a:schemeClr val="bg2">
@@ -2086,7 +2084,7 @@
             <a:effectLst/>
             <a:extLst>
               <a:ext uri="{AF507438-7753-43e0-B8FC-AC1667EBCBE1}">
-                <a14:hiddenEffects xmlns:a14="http://schemas.microsoft.com/office/drawing/2010/main" xmlns="">
+                <a14:hiddenEffects xmlns:a14="http://schemas.microsoft.com/office/drawing/2010/main">
                   <a:effectLst>
                     <a:outerShdw blurRad="63500" dist="38099" dir="2700000" algn="ctr" rotWithShape="0">
                       <a:schemeClr val="bg2">
@@ -2122,7 +2120,7 @@
           <a:blip r:embed="rId4">
             <a:extLst>
               <a:ext uri="{28A0092B-C50C-407E-A947-70E740481C1C}">
-                <a14:useLocalDpi xmlns:a14="http://schemas.microsoft.com/office/drawing/2010/main" xmlns="" val="0"/>
+                <a14:useLocalDpi xmlns:a14="http://schemas.microsoft.com/office/drawing/2010/main" val="0"/>
               </a:ext>
             </a:extLst>
           </a:blip>
@@ -2142,7 +2140,7 @@
           <a:noFill/>
           <a:extLst>
             <a:ext uri="{909E8E84-426E-40dd-AFC4-6F175D3DCCD1}">
-              <a14:hiddenFill xmlns:a14="http://schemas.microsoft.com/office/drawing/2010/main" xmlns="">
+              <a14:hiddenFill xmlns:a14="http://schemas.microsoft.com/office/drawing/2010/main">
                 <a:solidFill>
                   <a:srgbClr val="FFFFFF"/>
                 </a:solidFill>
@@ -2243,7 +2241,7 @@
   <p:timing>
     <p:tnLst>
       <p:par>
-        <p:cTn id="1" dur="indefinite" restart="never" nodeType="tmRoot"/>
+        <p:cTn xmlns:p14="http://schemas.microsoft.com/office/powerpoint/2010/main" id="1" dur="indefinite" restart="never" nodeType="tmRoot"/>
       </p:par>
     </p:tnLst>
   </p:timing>
@@ -2821,7 +2819,7 @@
           <a:blip r:embed="rId3">
             <a:extLst>
               <a:ext uri="{28A0092B-C50C-407E-A947-70E740481C1C}">
-                <a14:useLocalDpi xmlns:a14="http://schemas.microsoft.com/office/drawing/2010/main" xmlns="" val="0"/>
+                <a14:useLocalDpi xmlns:a14="http://schemas.microsoft.com/office/drawing/2010/main" val="0"/>
               </a:ext>
             </a:extLst>
           </a:blip>
@@ -2845,14 +2843,14 @@
           <a:effectLst/>
           <a:extLst>
             <a:ext uri="{909E8E84-426E-40dd-AFC4-6F175D3DCCD1}">
-              <a14:hiddenFill xmlns:a14="http://schemas.microsoft.com/office/drawing/2010/main" xmlns="">
+              <a14:hiddenFill xmlns:a14="http://schemas.microsoft.com/office/drawing/2010/main">
                 <a:solidFill>
                   <a:schemeClr val="accent1"/>
                 </a:solidFill>
               </a14:hiddenFill>
             </a:ext>
             <a:ext uri="{91240B29-F687-4f45-9708-019B960494DF}">
-              <a14:hiddenLine xmlns:a14="http://schemas.microsoft.com/office/drawing/2010/main" xmlns="" w="9525">
+              <a14:hiddenLine xmlns:a14="http://schemas.microsoft.com/office/drawing/2010/main" w="9525">
                 <a:solidFill>
                   <a:schemeClr val="tx1"/>
                 </a:solidFill>
@@ -2862,7 +2860,7 @@
               </a14:hiddenLine>
             </a:ext>
             <a:ext uri="{AF507438-7753-43e0-B8FC-AC1667EBCBE1}">
-              <a14:hiddenEffects xmlns:a14="http://schemas.microsoft.com/office/drawing/2010/main" xmlns="">
+              <a14:hiddenEffects xmlns:a14="http://schemas.microsoft.com/office/drawing/2010/main">
                 <a:effectLst>
                   <a:outerShdw blurRad="63500" dist="38099" dir="2700000" algn="ctr" rotWithShape="0">
                     <a:schemeClr val="bg2">
@@ -2887,7 +2885,7 @@
           <a:blip r:embed="rId4">
             <a:extLst>
               <a:ext uri="{28A0092B-C50C-407E-A947-70E740481C1C}">
-                <a14:useLocalDpi xmlns:a14="http://schemas.microsoft.com/office/drawing/2010/main" xmlns="" val="0"/>
+                <a14:useLocalDpi xmlns:a14="http://schemas.microsoft.com/office/drawing/2010/main" val="0"/>
               </a:ext>
             </a:extLst>
           </a:blip>
@@ -2907,7 +2905,7 @@
           <a:noFill/>
           <a:extLst>
             <a:ext uri="{909E8E84-426E-40dd-AFC4-6F175D3DCCD1}">
-              <a14:hiddenFill xmlns:a14="http://schemas.microsoft.com/office/drawing/2010/main" xmlns="">
+              <a14:hiddenFill xmlns:a14="http://schemas.microsoft.com/office/drawing/2010/main">
                 <a:solidFill>
                   <a:srgbClr val="FFFFFF"/>
                 </a:solidFill>
@@ -2924,7 +2922,7 @@
   <p:timing>
     <p:tnLst>
       <p:par>
-        <p:cTn id="1" dur="indefinite" restart="never" nodeType="tmRoot"/>
+        <p:cTn xmlns:p14="http://schemas.microsoft.com/office/powerpoint/2010/main" id="1" dur="indefinite" restart="never" nodeType="tmRoot"/>
       </p:par>
     </p:tnLst>
   </p:timing>
@@ -3048,7 +3046,7 @@
           <a:blip r:embed="rId2">
             <a:extLst>
               <a:ext uri="{28A0092B-C50C-407E-A947-70E740481C1C}">
-                <a14:useLocalDpi xmlns:a14="http://schemas.microsoft.com/office/drawing/2010/main" xmlns="" val="0"/>
+                <a14:useLocalDpi xmlns:a14="http://schemas.microsoft.com/office/drawing/2010/main" val="0"/>
               </a:ext>
             </a:extLst>
           </a:blip>
@@ -3072,14 +3070,14 @@
           <a:effectLst/>
           <a:extLst>
             <a:ext uri="{909E8E84-426E-40dd-AFC4-6F175D3DCCD1}">
-              <a14:hiddenFill xmlns:a14="http://schemas.microsoft.com/office/drawing/2010/main" xmlns="">
+              <a14:hiddenFill xmlns:a14="http://schemas.microsoft.com/office/drawing/2010/main">
                 <a:solidFill>
                   <a:srgbClr val="FFFFFF"/>
                 </a:solidFill>
               </a14:hiddenFill>
             </a:ext>
             <a:ext uri="{91240B29-F687-4f45-9708-019B960494DF}">
-              <a14:hiddenLine xmlns:a14="http://schemas.microsoft.com/office/drawing/2010/main" xmlns="" w="9525">
+              <a14:hiddenLine xmlns:a14="http://schemas.microsoft.com/office/drawing/2010/main" w="9525">
                 <a:solidFill>
                   <a:srgbClr val="000000"/>
                 </a:solidFill>
@@ -3089,7 +3087,7 @@
               </a14:hiddenLine>
             </a:ext>
             <a:ext uri="{AF507438-7753-43e0-B8FC-AC1667EBCBE1}">
-              <a14:hiddenEffects xmlns:a14="http://schemas.microsoft.com/office/drawing/2010/main" xmlns="">
+              <a14:hiddenEffects xmlns:a14="http://schemas.microsoft.com/office/drawing/2010/main">
                 <a:effectLst>
                   <a:outerShdw blurRad="63500" dist="38099" dir="2700000" algn="ctr" rotWithShape="0">
                     <a:srgbClr val="808080">
@@ -3100,7 +3098,7 @@
               </a14:hiddenEffects>
             </a:ext>
             <a:ext uri="{FAA26D3D-D897-4be2-8F04-BA451C77F1D7}">
-              <ma14:placeholderFlag xmlns:ma14="http://schemas.microsoft.com/office/mac/drawingml/2011/main" xmlns="" val="1"/>
+              <ma14:placeholderFlag xmlns:ma14="http://schemas.microsoft.com/office/mac/drawingml/2011/main" val="1"/>
             </a:ext>
           </a:extLst>
         </p:spPr>
@@ -3182,7 +3180,7 @@
     </p:spTree>
     <p:extLst>
       <p:ext uri="{BB962C8B-B14F-4D97-AF65-F5344CB8AC3E}">
-        <p14:creationId xmlns:p14="http://schemas.microsoft.com/office/powerpoint/2010/main" xmlns="" val="3448545192"/>
+        <p14:creationId xmlns:p14="http://schemas.microsoft.com/office/powerpoint/2010/main" val="3448545192"/>
       </p:ext>
     </p:extLst>
   </p:cSld>
@@ -3192,7 +3190,7 @@
   <p:timing>
     <p:tnLst>
       <p:par>
-        <p:cTn id="1" dur="indefinite" restart="never" nodeType="tmRoot"/>
+        <p:cTn xmlns:p14="http://schemas.microsoft.com/office/powerpoint/2010/main" id="1" dur="indefinite" restart="never" nodeType="tmRoot"/>
       </p:par>
     </p:tnLst>
   </p:timing>
@@ -3476,7 +3474,7 @@
     </p:spTree>
     <p:extLst>
       <p:ext uri="{BB962C8B-B14F-4D97-AF65-F5344CB8AC3E}">
-        <p14:creationId xmlns:p14="http://schemas.microsoft.com/office/powerpoint/2010/main" xmlns="" val="3475824736"/>
+        <p14:creationId xmlns:p14="http://schemas.microsoft.com/office/powerpoint/2010/main" val="3475824736"/>
       </p:ext>
     </p:extLst>
   </p:cSld>
@@ -3486,7 +3484,7 @@
   <p:timing>
     <p:tnLst>
       <p:par>
-        <p:cTn id="1" dur="indefinite" restart="never" nodeType="tmRoot"/>
+        <p:cTn xmlns:p14="http://schemas.microsoft.com/office/powerpoint/2010/main" id="1" dur="indefinite" restart="never" nodeType="tmRoot"/>
       </p:par>
     </p:tnLst>
   </p:timing>
@@ -3790,7 +3788,7 @@
     </p:spTree>
     <p:extLst>
       <p:ext uri="{BB962C8B-B14F-4D97-AF65-F5344CB8AC3E}">
-        <p14:creationId xmlns:p14="http://schemas.microsoft.com/office/powerpoint/2010/main" xmlns="" val="3008425115"/>
+        <p14:creationId xmlns:p14="http://schemas.microsoft.com/office/powerpoint/2010/main" val="3008425115"/>
       </p:ext>
     </p:extLst>
   </p:cSld>
@@ -3800,7 +3798,7 @@
   <p:timing>
     <p:tnLst>
       <p:par>
-        <p:cTn id="1" dur="indefinite" restart="never" nodeType="tmRoot"/>
+        <p:cTn xmlns:p14="http://schemas.microsoft.com/office/powerpoint/2010/main" id="1" dur="indefinite" restart="never" nodeType="tmRoot"/>
       </p:par>
     </p:tnLst>
   </p:timing>
@@ -4007,7 +4005,7 @@
     </p:spTree>
     <p:extLst>
       <p:ext uri="{BB962C8B-B14F-4D97-AF65-F5344CB8AC3E}">
-        <p14:creationId xmlns:p14="http://schemas.microsoft.com/office/powerpoint/2010/main" xmlns="" val="656913703"/>
+        <p14:creationId xmlns:p14="http://schemas.microsoft.com/office/powerpoint/2010/main" val="656913703"/>
       </p:ext>
     </p:extLst>
   </p:cSld>
@@ -4017,7 +4015,7 @@
   <p:timing>
     <p:tnLst>
       <p:par>
-        <p:cTn id="1" dur="indefinite" restart="never" nodeType="tmRoot"/>
+        <p:cTn xmlns:p14="http://schemas.microsoft.com/office/powerpoint/2010/main" id="1" dur="indefinite" restart="never" nodeType="tmRoot"/>
       </p:par>
     </p:tnLst>
   </p:timing>
@@ -4178,7 +4176,7 @@
     </p:spTree>
     <p:extLst>
       <p:ext uri="{BB962C8B-B14F-4D97-AF65-F5344CB8AC3E}">
-        <p14:creationId xmlns:p14="http://schemas.microsoft.com/office/powerpoint/2010/main" xmlns="" val="1022818423"/>
+        <p14:creationId xmlns:p14="http://schemas.microsoft.com/office/powerpoint/2010/main" val="1022818423"/>
       </p:ext>
     </p:extLst>
   </p:cSld>
@@ -4188,7 +4186,7 @@
   <p:timing>
     <p:tnLst>
       <p:par>
-        <p:cTn id="1" dur="indefinite" restart="never" nodeType="tmRoot"/>
+        <p:cTn xmlns:p14="http://schemas.microsoft.com/office/powerpoint/2010/main" id="1" dur="indefinite" restart="never" nodeType="tmRoot"/>
       </p:par>
     </p:tnLst>
   </p:timing>
@@ -4245,7 +4243,7 @@
             <p:ph idx="1"/>
             <p:extLst>
               <p:ext uri="{D42A27DB-BD31-4B8C-83A1-F6EECF244321}">
-                <p14:modId xmlns:p14="http://schemas.microsoft.com/office/powerpoint/2010/main" xmlns="" val="776485428"/>
+                <p14:modId xmlns:p14="http://schemas.microsoft.com/office/powerpoint/2010/main" val="776485428"/>
               </p:ext>
             </p:extLst>
           </p:nvPr>
@@ -4849,6 +4847,12 @@
               </a:rPr>
               <a:t> </a:t>
             </a:r>
+            <a:r>
+              <a:rPr lang="en-US" sz="1800" dirty="0" smtClean="0">
+                <a:sym typeface="Wingdings"/>
+              </a:rPr>
+              <a:t/>
+            </a:r>
             <a:br>
               <a:rPr lang="en-US" sz="1800" dirty="0" smtClean="0">
                 <a:sym typeface="Wingdings"/>
@@ -4911,7 +4915,7 @@
     </p:spTree>
     <p:extLst>
       <p:ext uri="{BB962C8B-B14F-4D97-AF65-F5344CB8AC3E}">
-        <p14:creationId xmlns:p14="http://schemas.microsoft.com/office/powerpoint/2010/main" xmlns="" val="1021552098"/>
+        <p14:creationId xmlns:p14="http://schemas.microsoft.com/office/powerpoint/2010/main" val="1021552098"/>
       </p:ext>
     </p:extLst>
   </p:cSld>
@@ -4921,7 +4925,7 @@
   <p:timing>
     <p:tnLst>
       <p:par>
-        <p:cTn id="1" dur="indefinite" restart="never" nodeType="tmRoot">
+        <p:cTn xmlns:p14="http://schemas.microsoft.com/office/powerpoint/2010/main" id="1" dur="indefinite" restart="never" nodeType="tmRoot">
           <p:childTnLst>
             <p:seq concurrent="1" nextAc="seek">
               <p:cTn id="2" dur="indefinite" nodeType="mainSeq">
@@ -5165,7 +5169,7 @@
     </p:spTree>
     <p:extLst>
       <p:ext uri="{BB962C8B-B14F-4D97-AF65-F5344CB8AC3E}">
-        <p14:creationId xmlns:p14="http://schemas.microsoft.com/office/powerpoint/2010/main" xmlns="" val="3782679262"/>
+        <p14:creationId xmlns:p14="http://schemas.microsoft.com/office/powerpoint/2010/main" val="3782679262"/>
       </p:ext>
     </p:extLst>
   </p:cSld>
@@ -5175,7 +5179,7 @@
   <p:timing>
     <p:tnLst>
       <p:par>
-        <p:cTn id="1" dur="indefinite" restart="never" nodeType="tmRoot">
+        <p:cTn xmlns:p14="http://schemas.microsoft.com/office/powerpoint/2010/main" id="1" dur="indefinite" restart="never" nodeType="tmRoot">
           <p:childTnLst>
             <p:seq concurrent="1" nextAc="seek">
               <p:cTn id="2" dur="indefinite" nodeType="mainSeq">
@@ -5644,7 +5648,7 @@
     </p:spTree>
     <p:extLst>
       <p:ext uri="{BB962C8B-B14F-4D97-AF65-F5344CB8AC3E}">
-        <p14:creationId xmlns:p14="http://schemas.microsoft.com/office/powerpoint/2010/main" xmlns="" val="2269063809"/>
+        <p14:creationId xmlns:p14="http://schemas.microsoft.com/office/powerpoint/2010/main" val="2269063809"/>
       </p:ext>
     </p:extLst>
   </p:cSld>
@@ -5654,7 +5658,7 @@
   <p:timing>
     <p:tnLst>
       <p:par>
-        <p:cTn id="1" dur="indefinite" restart="never" nodeType="tmRoot">
+        <p:cTn xmlns:p14="http://schemas.microsoft.com/office/powerpoint/2010/main" id="1" dur="indefinite" restart="never" nodeType="tmRoot">
           <p:childTnLst>
             <p:seq concurrent="1" nextAc="seek">
               <p:cTn id="2" dur="indefinite" nodeType="mainSeq">
@@ -6138,7 +6142,7 @@
         <a:effectLst/>
         <a:extLst>
           <a:ext uri="{AF507438-7753-43e0-B8FC-AC1667EBCBE1}">
-            <a14:hiddenEffects xmlns:a14="http://schemas.microsoft.com/office/drawing/2010/main" xmlns="">
+            <a14:hiddenEffects xmlns:a14="http://schemas.microsoft.com/office/drawing/2010/main">
               <a:effectLst>
                 <a:outerShdw blurRad="63500" dist="38099" dir="2700000" algn="ctr" rotWithShape="0">
                   <a:schemeClr val="bg2">
@@ -6214,7 +6218,7 @@
         <a:effectLst/>
         <a:extLst>
           <a:ext uri="{AF507438-7753-43e0-B8FC-AC1667EBCBE1}">
-            <a14:hiddenEffects xmlns:a14="http://schemas.microsoft.com/office/drawing/2010/main" xmlns="">
+            <a14:hiddenEffects xmlns:a14="http://schemas.microsoft.com/office/drawing/2010/main">
               <a:effectLst>
                 <a:outerShdw blurRad="63500" dist="38099" dir="2700000" algn="ctr" rotWithShape="0">
                   <a:schemeClr val="bg2">

</xml_diff>